<commit_message>
More syntax and formatting changes
</commit_message>
<xml_diff>
--- a/Gaming and AI Introduction - Teacher Handout.pptx
+++ b/Gaming and AI Introduction - Teacher Handout.pptx
@@ -222,7 +222,7 @@
           <a:p>
             <a:fld id="{40F19CDD-65A2-CB4A-9930-DEBB2983A954}" type="datetimeFigureOut">
               <a:rPr lang="en-US" smtClean="0"/>
-              <a:t>2/12/19</a:t>
+              <a:t>2/13/19</a:t>
             </a:fld>
             <a:endParaRPr lang="en-US"/>
           </a:p>
@@ -1331,7 +1331,7 @@
           <a:p>
             <a:fld id="{E62705FE-6449-7242-BBB5-7AF254F482BA}" type="datetimeFigureOut">
               <a:rPr lang="en-US" smtClean="0"/>
-              <a:t>2/12/19</a:t>
+              <a:t>2/13/19</a:t>
             </a:fld>
             <a:endParaRPr lang="en-US"/>
           </a:p>
@@ -1539,7 +1539,7 @@
           <a:p>
             <a:fld id="{E62705FE-6449-7242-BBB5-7AF254F482BA}" type="datetimeFigureOut">
               <a:rPr lang="en-US" smtClean="0"/>
-              <a:t>2/12/19</a:t>
+              <a:t>2/13/19</a:t>
             </a:fld>
             <a:endParaRPr lang="en-US"/>
           </a:p>
@@ -1747,7 +1747,7 @@
           <a:p>
             <a:fld id="{E62705FE-6449-7242-BBB5-7AF254F482BA}" type="datetimeFigureOut">
               <a:rPr lang="en-US" smtClean="0"/>
-              <a:t>2/12/19</a:t>
+              <a:t>2/13/19</a:t>
             </a:fld>
             <a:endParaRPr lang="en-US"/>
           </a:p>
@@ -1955,7 +1955,7 @@
           <a:p>
             <a:fld id="{E62705FE-6449-7242-BBB5-7AF254F482BA}" type="datetimeFigureOut">
               <a:rPr lang="en-US" smtClean="0"/>
-              <a:t>2/12/19</a:t>
+              <a:t>2/13/19</a:t>
             </a:fld>
             <a:endParaRPr lang="en-US"/>
           </a:p>
@@ -2230,7 +2230,7 @@
           <a:p>
             <a:fld id="{E62705FE-6449-7242-BBB5-7AF254F482BA}" type="datetimeFigureOut">
               <a:rPr lang="en-US" smtClean="0"/>
-              <a:t>2/12/19</a:t>
+              <a:t>2/13/19</a:t>
             </a:fld>
             <a:endParaRPr lang="en-US"/>
           </a:p>
@@ -2500,7 +2500,7 @@
           <a:p>
             <a:fld id="{E62705FE-6449-7242-BBB5-7AF254F482BA}" type="datetimeFigureOut">
               <a:rPr lang="en-US" smtClean="0"/>
-              <a:t>2/12/19</a:t>
+              <a:t>2/13/19</a:t>
             </a:fld>
             <a:endParaRPr lang="en-US"/>
           </a:p>
@@ -2912,7 +2912,7 @@
           <a:p>
             <a:fld id="{E62705FE-6449-7242-BBB5-7AF254F482BA}" type="datetimeFigureOut">
               <a:rPr lang="en-US" smtClean="0"/>
-              <a:t>2/12/19</a:t>
+              <a:t>2/13/19</a:t>
             </a:fld>
             <a:endParaRPr lang="en-US"/>
           </a:p>
@@ -3058,7 +3058,7 @@
           <a:p>
             <a:fld id="{E62705FE-6449-7242-BBB5-7AF254F482BA}" type="datetimeFigureOut">
               <a:rPr lang="en-US" smtClean="0"/>
-              <a:t>2/12/19</a:t>
+              <a:t>2/13/19</a:t>
             </a:fld>
             <a:endParaRPr lang="en-US"/>
           </a:p>
@@ -3171,7 +3171,7 @@
           <a:p>
             <a:fld id="{E62705FE-6449-7242-BBB5-7AF254F482BA}" type="datetimeFigureOut">
               <a:rPr lang="en-US" smtClean="0"/>
-              <a:t>2/12/19</a:t>
+              <a:t>2/13/19</a:t>
             </a:fld>
             <a:endParaRPr lang="en-US"/>
           </a:p>
@@ -3482,7 +3482,7 @@
           <a:p>
             <a:fld id="{E62705FE-6449-7242-BBB5-7AF254F482BA}" type="datetimeFigureOut">
               <a:rPr lang="en-US" smtClean="0"/>
-              <a:t>2/12/19</a:t>
+              <a:t>2/13/19</a:t>
             </a:fld>
             <a:endParaRPr lang="en-US"/>
           </a:p>
@@ -3770,7 +3770,7 @@
           <a:p>
             <a:fld id="{E62705FE-6449-7242-BBB5-7AF254F482BA}" type="datetimeFigureOut">
               <a:rPr lang="en-US" smtClean="0"/>
-              <a:t>2/12/19</a:t>
+              <a:t>2/13/19</a:t>
             </a:fld>
             <a:endParaRPr lang="en-US"/>
           </a:p>
@@ -4011,7 +4011,7 @@
           <a:p>
             <a:fld id="{E62705FE-6449-7242-BBB5-7AF254F482BA}" type="datetimeFigureOut">
               <a:rPr lang="en-US" smtClean="0"/>
-              <a:t>2/12/19</a:t>
+              <a:t>2/13/19</a:t>
             </a:fld>
             <a:endParaRPr lang="en-US"/>
           </a:p>
@@ -6284,7 +6284,7 @@
             <a:pPr algn="r" rtl="1"/>
             <a:r>
               <a:rPr lang="he-IL" dirty="0"/>
-              <a:t>3. בכדי לשמור שינויים שבוצעו בזמן ריצה – לחיצת עכבר שמאל</a:t>
+              <a:t>4. בכדי לשמור שינויים שבוצעו בזמן ריצה – לחיצת עכבר שמאל</a:t>
             </a:r>
           </a:p>
           <a:p>

</xml_diff>

<commit_message>
Updated based on early feedback
</commit_message>
<xml_diff>
--- a/Gaming and AI Introduction - Teacher Handout.pptx
+++ b/Gaming and AI Introduction - Teacher Handout.pptx
@@ -222,7 +222,7 @@
           <a:p>
             <a:fld id="{40F19CDD-65A2-CB4A-9930-DEBB2983A954}" type="datetimeFigureOut">
               <a:rPr lang="en-US" smtClean="0"/>
-              <a:t>2/13/19</a:t>
+              <a:t>2/26/19</a:t>
             </a:fld>
             <a:endParaRPr lang="en-US"/>
           </a:p>
@@ -1331,7 +1331,7 @@
           <a:p>
             <a:fld id="{E62705FE-6449-7242-BBB5-7AF254F482BA}" type="datetimeFigureOut">
               <a:rPr lang="en-US" smtClean="0"/>
-              <a:t>2/13/19</a:t>
+              <a:t>2/26/19</a:t>
             </a:fld>
             <a:endParaRPr lang="en-US"/>
           </a:p>
@@ -1539,7 +1539,7 @@
           <a:p>
             <a:fld id="{E62705FE-6449-7242-BBB5-7AF254F482BA}" type="datetimeFigureOut">
               <a:rPr lang="en-US" smtClean="0"/>
-              <a:t>2/13/19</a:t>
+              <a:t>2/26/19</a:t>
             </a:fld>
             <a:endParaRPr lang="en-US"/>
           </a:p>
@@ -1747,7 +1747,7 @@
           <a:p>
             <a:fld id="{E62705FE-6449-7242-BBB5-7AF254F482BA}" type="datetimeFigureOut">
               <a:rPr lang="en-US" smtClean="0"/>
-              <a:t>2/13/19</a:t>
+              <a:t>2/26/19</a:t>
             </a:fld>
             <a:endParaRPr lang="en-US"/>
           </a:p>
@@ -1955,7 +1955,7 @@
           <a:p>
             <a:fld id="{E62705FE-6449-7242-BBB5-7AF254F482BA}" type="datetimeFigureOut">
               <a:rPr lang="en-US" smtClean="0"/>
-              <a:t>2/13/19</a:t>
+              <a:t>2/26/19</a:t>
             </a:fld>
             <a:endParaRPr lang="en-US"/>
           </a:p>
@@ -2230,7 +2230,7 @@
           <a:p>
             <a:fld id="{E62705FE-6449-7242-BBB5-7AF254F482BA}" type="datetimeFigureOut">
               <a:rPr lang="en-US" smtClean="0"/>
-              <a:t>2/13/19</a:t>
+              <a:t>2/26/19</a:t>
             </a:fld>
             <a:endParaRPr lang="en-US"/>
           </a:p>
@@ -2500,7 +2500,7 @@
           <a:p>
             <a:fld id="{E62705FE-6449-7242-BBB5-7AF254F482BA}" type="datetimeFigureOut">
               <a:rPr lang="en-US" smtClean="0"/>
-              <a:t>2/13/19</a:t>
+              <a:t>2/26/19</a:t>
             </a:fld>
             <a:endParaRPr lang="en-US"/>
           </a:p>
@@ -2912,7 +2912,7 @@
           <a:p>
             <a:fld id="{E62705FE-6449-7242-BBB5-7AF254F482BA}" type="datetimeFigureOut">
               <a:rPr lang="en-US" smtClean="0"/>
-              <a:t>2/13/19</a:t>
+              <a:t>2/26/19</a:t>
             </a:fld>
             <a:endParaRPr lang="en-US"/>
           </a:p>
@@ -3058,7 +3058,7 @@
           <a:p>
             <a:fld id="{E62705FE-6449-7242-BBB5-7AF254F482BA}" type="datetimeFigureOut">
               <a:rPr lang="en-US" smtClean="0"/>
-              <a:t>2/13/19</a:t>
+              <a:t>2/26/19</a:t>
             </a:fld>
             <a:endParaRPr lang="en-US"/>
           </a:p>
@@ -3171,7 +3171,7 @@
           <a:p>
             <a:fld id="{E62705FE-6449-7242-BBB5-7AF254F482BA}" type="datetimeFigureOut">
               <a:rPr lang="en-US" smtClean="0"/>
-              <a:t>2/13/19</a:t>
+              <a:t>2/26/19</a:t>
             </a:fld>
             <a:endParaRPr lang="en-US"/>
           </a:p>
@@ -3482,7 +3482,7 @@
           <a:p>
             <a:fld id="{E62705FE-6449-7242-BBB5-7AF254F482BA}" type="datetimeFigureOut">
               <a:rPr lang="en-US" smtClean="0"/>
-              <a:t>2/13/19</a:t>
+              <a:t>2/26/19</a:t>
             </a:fld>
             <a:endParaRPr lang="en-US"/>
           </a:p>
@@ -3770,7 +3770,7 @@
           <a:p>
             <a:fld id="{E62705FE-6449-7242-BBB5-7AF254F482BA}" type="datetimeFigureOut">
               <a:rPr lang="en-US" smtClean="0"/>
-              <a:t>2/13/19</a:t>
+              <a:t>2/26/19</a:t>
             </a:fld>
             <a:endParaRPr lang="en-US"/>
           </a:p>
@@ -4011,7 +4011,7 @@
           <a:p>
             <a:fld id="{E62705FE-6449-7242-BBB5-7AF254F482BA}" type="datetimeFigureOut">
               <a:rPr lang="en-US" smtClean="0"/>
-              <a:t>2/13/19</a:t>
+              <a:t>2/26/19</a:t>
             </a:fld>
             <a:endParaRPr lang="en-US"/>
           </a:p>
@@ -7115,21 +7115,85 @@
             <a:pPr algn="r" rtl="1"/>
             <a:r>
               <a:rPr lang="he-IL" dirty="0"/>
-              <a:t>שילוב פתרונות אפשריים לבעיה והפעלת הליכים של ברירה מלאכותית כדי לבחור את המועמדים שיעברו לשלבים הבאים.</a:t>
+              <a:t>שילוב </a:t>
+            </a:r>
+            <a:r>
+              <a:rPr lang="he-IL" b="1" dirty="0"/>
+              <a:t>פתרונות</a:t>
+            </a:r>
+            <a:r>
+              <a:rPr lang="he-IL" dirty="0"/>
+              <a:t> אפשריים </a:t>
+            </a:r>
+            <a:r>
+              <a:rPr lang="he-IL" b="1" dirty="0"/>
+              <a:t>לבעיה</a:t>
+            </a:r>
+            <a:r>
+              <a:rPr lang="he-IL" dirty="0"/>
+              <a:t> והפעלת תהליכים של ברירה מלאכותית כדי לבחור את המועמדים שיעברו לשלבים הבאים.</a:t>
             </a:r>
           </a:p>
           <a:p>
             <a:pPr algn="r" rtl="1"/>
             <a:r>
               <a:rPr lang="he-IL" dirty="0"/>
-              <a:t>נערבב פתרונות אחד עם השני ונוסיף קצת רעש, נקבל דור חדש של פתרונות הקרוב צעד נוסף לפתרון הבעיה הנתונה.</a:t>
+              <a:t>בכדי לקבל </a:t>
+            </a:r>
+            <a:r>
+              <a:rPr lang="he-IL" b="1" dirty="0"/>
+              <a:t>פתרונות</a:t>
+            </a:r>
+            <a:r>
+              <a:rPr lang="he-IL" dirty="0"/>
+              <a:t> טובים יותר: ״</a:t>
+            </a:r>
+            <a:r>
+              <a:rPr lang="he-IL" b="1" dirty="0"/>
+              <a:t>נזווג</a:t>
+            </a:r>
+            <a:r>
+              <a:rPr lang="he-IL" dirty="0"/>
+              <a:t>״ </a:t>
+            </a:r>
+            <a:r>
+              <a:rPr lang="he-IL" b="1" dirty="0"/>
+              <a:t>פתרונות</a:t>
+            </a:r>
+            <a:r>
+              <a:rPr lang="he-IL" dirty="0"/>
+              <a:t> אחד עם השני וכך נקבל </a:t>
+            </a:r>
+            <a:r>
+              <a:rPr lang="he-IL" b="1" dirty="0"/>
+              <a:t>דור</a:t>
+            </a:r>
+            <a:r>
+              <a:rPr lang="he-IL" dirty="0"/>
+              <a:t> חדש של </a:t>
+            </a:r>
+            <a:r>
+              <a:rPr lang="he-IL" b="1" dirty="0"/>
+              <a:t>פתרונות</a:t>
+            </a:r>
+            <a:r>
+              <a:rPr lang="he-IL" dirty="0"/>
+              <a:t> הקרוב צעד נוסף לפתרון הבעיה הנתונה.</a:t>
             </a:r>
           </a:p>
           <a:p>
             <a:pPr algn="r" rtl="1"/>
             <a:r>
               <a:rPr lang="he-IL" dirty="0"/>
-              <a:t>נחזור על התהליך מספר רב של פעמים (דורות) ולבסוף נגיע לפתרון הקרוב ביותר.</a:t>
+              <a:t>נחזור על התהליך מספר רב של פעמים (</a:t>
+            </a:r>
+            <a:r>
+              <a:rPr lang="he-IL" b="1" dirty="0"/>
+              <a:t>דורות</a:t>
+            </a:r>
+            <a:r>
+              <a:rPr lang="he-IL" dirty="0"/>
+              <a:t>) ולבסוף נגיע לפתרון הקרוב ביותר.</a:t>
             </a:r>
           </a:p>
         </p:txBody>
@@ -7214,13 +7278,19 @@
         </p:nvSpPr>
         <p:spPr/>
         <p:txBody>
-          <a:bodyPr/>
+          <a:bodyPr>
+            <a:normAutofit lnSpcReduction="10000"/>
+          </a:bodyPr>
           <a:lstStyle/>
           <a:p>
             <a:pPr algn="r" rtl="1"/>
             <a:r>
-              <a:rPr lang="he-IL" dirty="0"/>
-              <a:t>אוכלוסייה (</a:t>
+              <a:rPr lang="he-IL" b="1" dirty="0"/>
+              <a:t>אוכלוסייה</a:t>
+            </a:r>
+            <a:r>
+              <a:rPr lang="he-IL" dirty="0"/>
+              <a:t> (</a:t>
             </a:r>
             <a:r>
               <a:rPr lang="en-US" dirty="0"/>
@@ -7228,7 +7298,15 @@
             </a:r>
             <a:r>
               <a:rPr lang="he-IL" dirty="0"/>
-              <a:t>): אוסף פתרונות (פריטים) כלשהן לבעיה, </a:t>
+              <a:t>): אוסף </a:t>
+            </a:r>
+            <a:r>
+              <a:rPr lang="he-IL" b="1" dirty="0"/>
+              <a:t>פתרונות</a:t>
+            </a:r>
+            <a:r>
+              <a:rPr lang="he-IL" dirty="0"/>
+              <a:t> (פריטים) כלשהן לבעיה, </a:t>
             </a:r>
             <a:r>
               <a:rPr lang="he-IL" dirty="0" err="1"/>
@@ -7242,8 +7320,12 @@
           <a:p>
             <a:pPr algn="r" rtl="1"/>
             <a:r>
-              <a:rPr lang="he-IL" dirty="0"/>
-              <a:t>זיווג (</a:t>
+              <a:rPr lang="he-IL" b="1" dirty="0"/>
+              <a:t>זיווג</a:t>
+            </a:r>
+            <a:r>
+              <a:rPr lang="he-IL" dirty="0"/>
+              <a:t> (</a:t>
             </a:r>
             <a:r>
               <a:rPr lang="en-US" dirty="0"/>
@@ -7251,14 +7333,34 @@
             </a:r>
             <a:r>
               <a:rPr lang="he-IL" dirty="0"/>
-              <a:t>): יצירת פריט חדש משניים או יותר פריטים קיימים</a:t>
+              <a:t>): יצירת </a:t>
+            </a:r>
+            <a:r>
+              <a:rPr lang="he-IL" b="1" dirty="0"/>
+              <a:t>פתרון</a:t>
+            </a:r>
+            <a:r>
+              <a:rPr lang="he-IL" dirty="0"/>
+              <a:t> (פריט) חדש משניים או יותר </a:t>
+            </a:r>
+            <a:r>
+              <a:rPr lang="he-IL" b="1" dirty="0"/>
+              <a:t>פתרונות</a:t>
+            </a:r>
+            <a:r>
+              <a:rPr lang="he-IL" dirty="0"/>
+              <a:t> (פריטים) קיימים</a:t>
             </a:r>
           </a:p>
           <a:p>
             <a:pPr algn="r" rtl="1"/>
             <a:r>
-              <a:rPr lang="he-IL" dirty="0"/>
-              <a:t>מוטציה (</a:t>
+              <a:rPr lang="he-IL" b="1" dirty="0"/>
+              <a:t>מוטציה</a:t>
+            </a:r>
+            <a:r>
+              <a:rPr lang="he-IL" dirty="0"/>
+              <a:t> (</a:t>
             </a:r>
             <a:r>
               <a:rPr lang="en-US" dirty="0"/>
@@ -7266,14 +7368,26 @@
             </a:r>
             <a:r>
               <a:rPr lang="he-IL" dirty="0"/>
-              <a:t>): פרט בודד שמשנה את התכונות שלו.</a:t>
+              <a:t>): </a:t>
+            </a:r>
+            <a:r>
+              <a:rPr lang="he-IL" b="1" dirty="0"/>
+              <a:t>פתרון</a:t>
+            </a:r>
+            <a:r>
+              <a:rPr lang="he-IL" dirty="0"/>
+              <a:t> בודד שמשנה את התכונות שלו.</a:t>
             </a:r>
           </a:p>
           <a:p>
             <a:pPr algn="r" rtl="1"/>
             <a:r>
-              <a:rPr lang="he-IL" dirty="0"/>
-              <a:t>שיערוך (</a:t>
+              <a:rPr lang="he-IL" b="1" dirty="0"/>
+              <a:t>שיערוך</a:t>
+            </a:r>
+            <a:r>
+              <a:rPr lang="he-IL" dirty="0"/>
+              <a:t> (</a:t>
             </a:r>
             <a:r>
               <a:rPr lang="en-US" dirty="0"/>
@@ -7281,14 +7395,26 @@
             </a:r>
             <a:r>
               <a:rPr lang="he-IL" dirty="0"/>
-              <a:t>): יצירת אוכלוסייה חדשה ע״י שיערוך כל הפריטים הנוכחיים, זיווגם ויצירת מוטציות.</a:t>
+              <a:t>): יצירת אוכלוסייה חדשה ע״י </a:t>
+            </a:r>
+            <a:r>
+              <a:rPr lang="he-IL" b="1" dirty="0"/>
+              <a:t>שיערוך</a:t>
+            </a:r>
+            <a:r>
+              <a:rPr lang="he-IL" dirty="0"/>
+              <a:t> כל הפתרונות הנוכחיים, זיווגם ויצירת מוטציות.</a:t>
             </a:r>
           </a:p>
           <a:p>
             <a:pPr algn="r" rtl="1"/>
             <a:r>
-              <a:rPr lang="he-IL" dirty="0"/>
-              <a:t>פונקציית כשירות (</a:t>
+              <a:rPr lang="he-IL" b="1" dirty="0"/>
+              <a:t>פונקציית כשירות </a:t>
+            </a:r>
+            <a:r>
+              <a:rPr lang="he-IL" dirty="0"/>
+              <a:t>(</a:t>
             </a:r>
             <a:r>
               <a:rPr lang="en-US" dirty="0"/>
@@ -7296,14 +7422,42 @@
             </a:r>
             <a:r>
               <a:rPr lang="he-IL" dirty="0"/>
-              <a:t>): הערכת הפריט (הפתרון) לעומת הפריטים האחרים בכדי למצוא את הפריטים הטובים ביותר</a:t>
+              <a:t>): הערכת </a:t>
+            </a:r>
+            <a:r>
+              <a:rPr lang="he-IL" b="1" dirty="0"/>
+              <a:t>הפתרון</a:t>
+            </a:r>
+            <a:r>
+              <a:rPr lang="he-IL" dirty="0"/>
+              <a:t> לעומת </a:t>
+            </a:r>
+            <a:r>
+              <a:rPr lang="he-IL" b="1" dirty="0"/>
+              <a:t>הפתרונות</a:t>
+            </a:r>
+            <a:r>
+              <a:rPr lang="he-IL" dirty="0"/>
+              <a:t> האחרים בכדי למצוא את </a:t>
+            </a:r>
+            <a:r>
+              <a:rPr lang="he-IL" b="1" dirty="0"/>
+              <a:t>הפתרונות</a:t>
+            </a:r>
+            <a:r>
+              <a:rPr lang="he-IL" dirty="0"/>
+              <a:t> הטובים ביותר</a:t>
             </a:r>
           </a:p>
           <a:p>
             <a:pPr algn="r" rtl="1"/>
             <a:r>
-              <a:rPr lang="he-IL" dirty="0"/>
-              <a:t>דור (</a:t>
+              <a:rPr lang="he-IL" b="1" dirty="0"/>
+              <a:t>דור</a:t>
+            </a:r>
+            <a:r>
+              <a:rPr lang="he-IL" dirty="0"/>
+              <a:t> (</a:t>
             </a:r>
             <a:r>
               <a:rPr lang="en-US" dirty="0"/>
@@ -7311,7 +7465,23 @@
             </a:r>
             <a:r>
               <a:rPr lang="he-IL" dirty="0"/>
-              <a:t>): בסיום שיערוך, נוצר אוסף פריטים חדש שמהווה דור חדש. </a:t>
+              <a:t>): בסיום שיערוך, נוצר אוסף </a:t>
+            </a:r>
+            <a:r>
+              <a:rPr lang="he-IL" b="1" dirty="0"/>
+              <a:t>פתרונות</a:t>
+            </a:r>
+            <a:r>
+              <a:rPr lang="he-IL" dirty="0"/>
+              <a:t> חדש שמהווה </a:t>
+            </a:r>
+            <a:r>
+              <a:rPr lang="he-IL" b="1" dirty="0"/>
+              <a:t>דור</a:t>
+            </a:r>
+            <a:r>
+              <a:rPr lang="he-IL" dirty="0"/>
+              <a:t> חדש. </a:t>
             </a:r>
           </a:p>
         </p:txBody>
@@ -7412,7 +7582,15 @@
             </a:pPr>
             <a:r>
               <a:rPr lang="he-IL" dirty="0"/>
-              <a:t>1. צור אוכלוסייה התחלתית</a:t>
+              <a:t>1. צור </a:t>
+            </a:r>
+            <a:r>
+              <a:rPr lang="he-IL" b="1" dirty="0"/>
+              <a:t>אוכלוסייה</a:t>
+            </a:r>
+            <a:r>
+              <a:rPr lang="he-IL" dirty="0"/>
+              <a:t> התחלתית</a:t>
             </a:r>
           </a:p>
           <a:p>
@@ -7421,7 +7599,15 @@
             </a:pPr>
             <a:r>
               <a:rPr lang="he-IL" dirty="0"/>
-              <a:t>2. הערך את ההתאמה של כל פרט באוכלוסייה</a:t>
+              <a:t>2. הערך את ההתאמה של כל </a:t>
+            </a:r>
+            <a:r>
+              <a:rPr lang="he-IL" b="1" dirty="0"/>
+              <a:t>פתרון</a:t>
+            </a:r>
+            <a:r>
+              <a:rPr lang="he-IL" dirty="0"/>
+              <a:t> באוכלוסייה</a:t>
             </a:r>
           </a:p>
           <a:p>
@@ -7430,7 +7616,15 @@
             </a:pPr>
             <a:r>
               <a:rPr lang="he-IL" dirty="0"/>
-              <a:t>3. בחר את הפרטים המתאימים ביותר לזיווג</a:t>
+              <a:t>3. בחר את </a:t>
+            </a:r>
+            <a:r>
+              <a:rPr lang="he-IL" b="1" dirty="0"/>
+              <a:t>הפתרונות</a:t>
+            </a:r>
+            <a:r>
+              <a:rPr lang="he-IL" dirty="0"/>
+              <a:t> המתאימים ביותר</a:t>
             </a:r>
           </a:p>
           <a:p>
@@ -7439,7 +7633,23 @@
             </a:pPr>
             <a:r>
               <a:rPr lang="he-IL" dirty="0"/>
-              <a:t>		             צור דור חדש של פרטים על ידי זיווג ומוטציה של הדור הקודם</a:t>
+              <a:t>		             צור </a:t>
+            </a:r>
+            <a:r>
+              <a:rPr lang="he-IL" b="1" dirty="0"/>
+              <a:t>דור</a:t>
+            </a:r>
+            <a:r>
+              <a:rPr lang="he-IL" dirty="0"/>
+              <a:t> חדש של </a:t>
+            </a:r>
+            <a:r>
+              <a:rPr lang="he-IL" b="1" dirty="0"/>
+              <a:t>פתרונות</a:t>
+            </a:r>
+            <a:r>
+              <a:rPr lang="he-IL" dirty="0"/>
+              <a:t> על ידי זיווג ומוטציה של הדור הקודם</a:t>
             </a:r>
           </a:p>
           <a:p>
@@ -8211,7 +8421,7 @@
             <a:pPr marL="0" algn="ctr" defTabSz="914400" rtl="1" eaLnBrk="1" latinLnBrk="0" hangingPunct="1"/>
             <a:r>
               <a:rPr lang="he-IL" dirty="0"/>
-              <a:t>הפריטים</a:t>
+              <a:t>הפתרונות</a:t>
             </a:r>
             <a:endParaRPr lang="en-US" dirty="0"/>
           </a:p>
@@ -8965,7 +9175,7 @@
             <a:pPr marL="0" algn="ctr" defTabSz="914400" rtl="1" eaLnBrk="1" latinLnBrk="0" hangingPunct="1"/>
             <a:r>
               <a:rPr lang="he-IL" dirty="0"/>
-              <a:t>הפריטים</a:t>
+              <a:t>הפתרונות</a:t>
             </a:r>
             <a:endParaRPr lang="en-US" dirty="0"/>
           </a:p>
@@ -11384,7 +11594,7 @@
         <p:spPr>
           <a:xfrm>
             <a:off x="8073593" y="1357349"/>
-            <a:ext cx="3710608" cy="2031325"/>
+            <a:ext cx="3710608" cy="2308324"/>
           </a:xfrm>
           <a:prstGeom prst="rect">
             <a:avLst/>
@@ -11413,7 +11623,15 @@
             <a:pPr marL="0" algn="r" defTabSz="914400" rtl="1" eaLnBrk="1" latinLnBrk="0" hangingPunct="1"/>
             <a:r>
               <a:rPr lang="he-IL" dirty="0"/>
-              <a:t>כל פריט באוכלוסייה מכיל רשת עצבית כאלגוריתם החלטה:</a:t>
+              <a:t>כל פתרון באוכלוסייה מכיל רשת עצבית כאלגוריתם החלטה – </a:t>
+            </a:r>
+            <a:r>
+              <a:rPr lang="he-IL" b="1" dirty="0"/>
+              <a:t>זהו הקוד הגנטי של הציפור</a:t>
+            </a:r>
+            <a:r>
+              <a:rPr lang="he-IL" dirty="0"/>
+              <a:t>:</a:t>
             </a:r>
           </a:p>
           <a:p>

</xml_diff>